<commit_message>
course wrapup, final report + supporting files added
</commit_message>
<xml_diff>
--- a/project/6213 - Demo for End-to-End Inference.pptx
+++ b/project/6213 - Demo for End-to-End Inference.pptx
@@ -5,7 +5,7 @@
     <p:sldMasterId id="2147483659" r:id="rId1"/>
   </p:sldMasterIdLst>
   <p:notesMasterIdLst>
-    <p:notesMasterId r:id="rId8"/>
+    <p:notesMasterId r:id="rId9"/>
   </p:notesMasterIdLst>
   <p:sldIdLst>
     <p:sldId id="256" r:id="rId2"/>
@@ -13,7 +13,8 @@
     <p:sldId id="1005" r:id="rId4"/>
     <p:sldId id="1006" r:id="rId5"/>
     <p:sldId id="1007" r:id="rId6"/>
-    <p:sldId id="1008" r:id="rId7"/>
+    <p:sldId id="1009" r:id="rId7"/>
+    <p:sldId id="1008" r:id="rId8"/>
   </p:sldIdLst>
   <p:sldSz cx="9144000" cy="5143500" type="screen16x9"/>
   <p:notesSz cx="6858000" cy="9144000"/>
@@ -260,6 +261,7 @@
             <p14:sldId id="1005"/>
             <p14:sldId id="1006"/>
             <p14:sldId id="1007"/>
+            <p14:sldId id="1009"/>
             <p14:sldId id="1008"/>
           </p14:sldIdLst>
         </p14:section>
@@ -6906,8 +6908,8 @@
           </a:p>
         </p:txBody>
       </p:sp>
-      <mc:AlternateContent xmlns:mc="http://schemas.openxmlformats.org/markup-compatibility/2006">
-        <mc:Choice xmlns:a14="http://schemas.microsoft.com/office/drawing/2010/main" Requires="a14">
+      <mc:AlternateContent xmlns:mc="http://schemas.openxmlformats.org/markup-compatibility/2006" xmlns:a14="http://schemas.microsoft.com/office/drawing/2010/main">
+        <mc:Choice Requires="a14">
           <p:sp>
             <p:nvSpPr>
               <p:cNvPr id="4" name="Text Placeholder 3">
@@ -7069,7 +7071,7 @@
             </p:txBody>
           </p:sp>
         </mc:Choice>
-        <mc:Fallback>
+        <mc:Fallback xmlns="">
           <p:sp>
             <p:nvSpPr>
               <p:cNvPr id="4" name="Text Placeholder 3">
@@ -7287,6 +7289,220 @@
 </file>
 
 <file path=ppt/slides/slide6.xml><?xml version="1.0" encoding="utf-8"?>
+<p:sld xmlns:a="http://schemas.openxmlformats.org/drawingml/2006/main" xmlns:r="http://schemas.openxmlformats.org/officeDocument/2006/relationships" xmlns:p="http://schemas.openxmlformats.org/presentationml/2006/main">
+  <p:cSld>
+    <p:spTree>
+      <p:nvGrpSpPr>
+        <p:cNvPr id="1" name=""/>
+        <p:cNvGrpSpPr/>
+        <p:nvPr/>
+      </p:nvGrpSpPr>
+      <p:grpSpPr>
+        <a:xfrm>
+          <a:off x="0" y="0"/>
+          <a:ext cx="0" cy="0"/>
+          <a:chOff x="0" y="0"/>
+          <a:chExt cx="0" cy="0"/>
+        </a:xfrm>
+      </p:grpSpPr>
+      <p:pic>
+        <p:nvPicPr>
+          <p:cNvPr id="5" name="Picture 4">
+            <a:extLst>
+              <a:ext uri="{FF2B5EF4-FFF2-40B4-BE49-F238E27FC236}">
+                <a16:creationId xmlns:a16="http://schemas.microsoft.com/office/drawing/2014/main" id="{A1BDBD71-15CD-C8FA-860B-B97DA1741764}"/>
+              </a:ext>
+            </a:extLst>
+          </p:cNvPr>
+          <p:cNvPicPr>
+            <a:picLocks noChangeAspect="1"/>
+          </p:cNvPicPr>
+          <p:nvPr/>
+        </p:nvPicPr>
+        <p:blipFill>
+          <a:blip r:embed="rId2"/>
+          <a:stretch>
+            <a:fillRect/>
+          </a:stretch>
+        </p:blipFill>
+        <p:spPr>
+          <a:xfrm>
+            <a:off x="5614013" y="1435446"/>
+            <a:ext cx="2331922" cy="2453853"/>
+          </a:xfrm>
+          <a:prstGeom prst="rect">
+            <a:avLst/>
+          </a:prstGeom>
+        </p:spPr>
+      </p:pic>
+      <p:pic>
+        <p:nvPicPr>
+          <p:cNvPr id="7" name="Picture 6">
+            <a:extLst>
+              <a:ext uri="{FF2B5EF4-FFF2-40B4-BE49-F238E27FC236}">
+                <a16:creationId xmlns:a16="http://schemas.microsoft.com/office/drawing/2014/main" id="{376518C5-7D8E-F607-A08E-6472C68D886B}"/>
+              </a:ext>
+            </a:extLst>
+          </p:cNvPr>
+          <p:cNvPicPr>
+            <a:picLocks noChangeAspect="1"/>
+          </p:cNvPicPr>
+          <p:nvPr/>
+        </p:nvPicPr>
+        <p:blipFill>
+          <a:blip r:embed="rId3"/>
+          <a:stretch>
+            <a:fillRect/>
+          </a:stretch>
+        </p:blipFill>
+        <p:spPr>
+          <a:xfrm>
+            <a:off x="794085" y="1254201"/>
+            <a:ext cx="3537284" cy="2635098"/>
+          </a:xfrm>
+          <a:prstGeom prst="rect">
+            <a:avLst/>
+          </a:prstGeom>
+        </p:spPr>
+      </p:pic>
+      <p:sp>
+        <p:nvSpPr>
+          <p:cNvPr id="8" name="TextBox 7">
+            <a:extLst>
+              <a:ext uri="{FF2B5EF4-FFF2-40B4-BE49-F238E27FC236}">
+                <a16:creationId xmlns:a16="http://schemas.microsoft.com/office/drawing/2014/main" id="{1DA3CB36-8248-290E-030E-46C0D32AED7F}"/>
+              </a:ext>
+            </a:extLst>
+          </p:cNvPr>
+          <p:cNvSpPr txBox="1"/>
+          <p:nvPr/>
+        </p:nvSpPr>
+        <p:spPr>
+          <a:xfrm>
+            <a:off x="1319134" y="4117298"/>
+            <a:ext cx="3072983" cy="307777"/>
+          </a:xfrm>
+          <a:prstGeom prst="rect">
+            <a:avLst/>
+          </a:prstGeom>
+          <a:noFill/>
+        </p:spPr>
+        <p:txBody>
+          <a:bodyPr wrap="square" rtlCol="0">
+            <a:spAutoFit/>
+          </a:bodyPr>
+          <a:lstStyle/>
+          <a:p>
+            <a:r>
+              <a:rPr lang="en-US" b="1" dirty="0"/>
+              <a:t>Live Image Before Processing</a:t>
+            </a:r>
+          </a:p>
+        </p:txBody>
+      </p:sp>
+      <p:sp>
+        <p:nvSpPr>
+          <p:cNvPr id="9" name="TextBox 8">
+            <a:extLst>
+              <a:ext uri="{FF2B5EF4-FFF2-40B4-BE49-F238E27FC236}">
+                <a16:creationId xmlns:a16="http://schemas.microsoft.com/office/drawing/2014/main" id="{5C539581-DAFC-18D7-3957-7A9501C0B5E2}"/>
+              </a:ext>
+            </a:extLst>
+          </p:cNvPr>
+          <p:cNvSpPr txBox="1"/>
+          <p:nvPr/>
+        </p:nvSpPr>
+        <p:spPr>
+          <a:xfrm>
+            <a:off x="5591331" y="4117298"/>
+            <a:ext cx="3072983" cy="307777"/>
+          </a:xfrm>
+          <a:prstGeom prst="rect">
+            <a:avLst/>
+          </a:prstGeom>
+          <a:noFill/>
+        </p:spPr>
+        <p:txBody>
+          <a:bodyPr wrap="square" rtlCol="0">
+            <a:spAutoFit/>
+          </a:bodyPr>
+          <a:lstStyle/>
+          <a:p>
+            <a:r>
+              <a:rPr lang="en-US" b="1" dirty="0"/>
+              <a:t>Live Image After Processing</a:t>
+            </a:r>
+          </a:p>
+        </p:txBody>
+      </p:sp>
+      <p:sp>
+        <p:nvSpPr>
+          <p:cNvPr id="10" name="Arrow: Right 9">
+            <a:extLst>
+              <a:ext uri="{FF2B5EF4-FFF2-40B4-BE49-F238E27FC236}">
+                <a16:creationId xmlns:a16="http://schemas.microsoft.com/office/drawing/2014/main" id="{DEF1218F-8557-47E4-4C13-2C6F7825374A}"/>
+              </a:ext>
+            </a:extLst>
+          </p:cNvPr>
+          <p:cNvSpPr/>
+          <p:nvPr/>
+        </p:nvSpPr>
+        <p:spPr>
+          <a:xfrm>
+            <a:off x="4511021" y="2320401"/>
+            <a:ext cx="988741" cy="683941"/>
+          </a:xfrm>
+          <a:prstGeom prst="rightArrow">
+            <a:avLst/>
+          </a:prstGeom>
+          <a:solidFill>
+            <a:srgbClr val="38761D"/>
+          </a:solidFill>
+          <a:ln>
+            <a:solidFill>
+              <a:schemeClr val="tx1"/>
+            </a:solidFill>
+          </a:ln>
+        </p:spPr>
+        <p:style>
+          <a:lnRef idx="2">
+            <a:schemeClr val="accent1">
+              <a:shade val="50000"/>
+            </a:schemeClr>
+          </a:lnRef>
+          <a:fillRef idx="1">
+            <a:schemeClr val="accent1"/>
+          </a:fillRef>
+          <a:effectRef idx="0">
+            <a:schemeClr val="accent1"/>
+          </a:effectRef>
+          <a:fontRef idx="minor">
+            <a:schemeClr val="lt1"/>
+          </a:fontRef>
+        </p:style>
+        <p:txBody>
+          <a:bodyPr rtlCol="0" anchor="ctr"/>
+          <a:lstStyle/>
+          <a:p>
+            <a:pPr algn="ctr"/>
+            <a:endParaRPr lang="en-US"/>
+          </a:p>
+        </p:txBody>
+      </p:sp>
+    </p:spTree>
+    <p:extLst>
+      <p:ext uri="{BB962C8B-B14F-4D97-AF65-F5344CB8AC3E}">
+        <p14:creationId xmlns:p14="http://schemas.microsoft.com/office/powerpoint/2010/main" val="1400074122"/>
+      </p:ext>
+    </p:extLst>
+  </p:cSld>
+  <p:clrMapOvr>
+    <a:masterClrMapping/>
+  </p:clrMapOvr>
+</p:sld>
+</file>
+
+<file path=ppt/slides/slide7.xml><?xml version="1.0" encoding="utf-8"?>
 <p:sld xmlns:a="http://schemas.openxmlformats.org/drawingml/2006/main" xmlns:r="http://schemas.openxmlformats.org/officeDocument/2006/relationships" xmlns:p="http://schemas.openxmlformats.org/presentationml/2006/main">
   <p:cSld>
     <p:spTree>

</xml_diff>